<commit_message>
fix bugs for data cache server
</commit_message>
<xml_diff>
--- a/Development/Documents/ZionEngine.pptx
+++ b/Development/Documents/ZionEngine.pptx
@@ -1063,14 +1063,35 @@
         </dgm:presLayoutVars>
       </dgm:prSet>
       <dgm:spPr/>
+      <dgm:t>
+        <a:bodyPr/>
+        <a:lstStyle/>
+        <a:p>
+          <a:endParaRPr lang="zh-CN" altLang="en-US"/>
+        </a:p>
+      </dgm:t>
     </dgm:pt>
     <dgm:pt modelId="{89986436-FEA1-43AB-B40D-E202FAB590F7}" type="pres">
       <dgm:prSet presAssocID="{626602CC-9111-487C-97A0-86D1844E6C57}" presName="centerShape" presStyleLbl="node0" presStyleIdx="0" presStyleCnt="1"/>
       <dgm:spPr/>
+      <dgm:t>
+        <a:bodyPr/>
+        <a:lstStyle/>
+        <a:p>
+          <a:endParaRPr lang="zh-CN" altLang="en-US"/>
+        </a:p>
+      </dgm:t>
     </dgm:pt>
     <dgm:pt modelId="{35E9A4E7-AFEC-4E78-8C39-CC8527E0347E}" type="pres">
       <dgm:prSet presAssocID="{4998DA0F-BF34-4D47-9F34-F2CE5B7D9F4A}" presName="parTrans" presStyleLbl="bgSibTrans2D1" presStyleIdx="0" presStyleCnt="3"/>
       <dgm:spPr/>
+      <dgm:t>
+        <a:bodyPr/>
+        <a:lstStyle/>
+        <a:p>
+          <a:endParaRPr lang="zh-CN" altLang="en-US"/>
+        </a:p>
+      </dgm:t>
     </dgm:pt>
     <dgm:pt modelId="{F5AFC2A8-2C14-4039-8473-77D89A06B5E5}" type="pres">
       <dgm:prSet presAssocID="{86DAB89B-4ED3-49B0-99A6-44C2AF274618}" presName="node" presStyleLbl="node1" presStyleIdx="0" presStyleCnt="3">
@@ -1079,10 +1100,24 @@
         </dgm:presLayoutVars>
       </dgm:prSet>
       <dgm:spPr/>
+      <dgm:t>
+        <a:bodyPr/>
+        <a:lstStyle/>
+        <a:p>
+          <a:endParaRPr lang="zh-CN" altLang="en-US"/>
+        </a:p>
+      </dgm:t>
     </dgm:pt>
     <dgm:pt modelId="{7A030CDB-9544-4D0B-8223-150CFF0A4A30}" type="pres">
       <dgm:prSet presAssocID="{4DEFB4E3-DA77-48D9-B2AD-83E1F4246E02}" presName="parTrans" presStyleLbl="bgSibTrans2D1" presStyleIdx="1" presStyleCnt="3"/>
       <dgm:spPr/>
+      <dgm:t>
+        <a:bodyPr/>
+        <a:lstStyle/>
+        <a:p>
+          <a:endParaRPr lang="zh-CN" altLang="en-US"/>
+        </a:p>
+      </dgm:t>
     </dgm:pt>
     <dgm:pt modelId="{33BCD56F-9C71-4262-B5DA-A473B3A86791}" type="pres">
       <dgm:prSet presAssocID="{98B876A4-F421-4E74-8E2C-DDC863D10D5B}" presName="node" presStyleLbl="node1" presStyleIdx="1" presStyleCnt="3">
@@ -1091,10 +1126,24 @@
         </dgm:presLayoutVars>
       </dgm:prSet>
       <dgm:spPr/>
+      <dgm:t>
+        <a:bodyPr/>
+        <a:lstStyle/>
+        <a:p>
+          <a:endParaRPr lang="zh-CN" altLang="en-US"/>
+        </a:p>
+      </dgm:t>
     </dgm:pt>
     <dgm:pt modelId="{B84BBDA2-4E2F-46D3-8679-D5DD8810EA5D}" type="pres">
       <dgm:prSet presAssocID="{783EB2F3-9AD1-406F-A20E-5D3FABD35667}" presName="parTrans" presStyleLbl="bgSibTrans2D1" presStyleIdx="2" presStyleCnt="3"/>
       <dgm:spPr/>
+      <dgm:t>
+        <a:bodyPr/>
+        <a:lstStyle/>
+        <a:p>
+          <a:endParaRPr lang="zh-CN" altLang="en-US"/>
+        </a:p>
+      </dgm:t>
     </dgm:pt>
     <dgm:pt modelId="{D4CD2CA9-096D-40E0-A388-795EE887B7B9}" type="pres">
       <dgm:prSet presAssocID="{90D425EB-7C3A-45AA-A243-DC55453210A7}" presName="node" presStyleLbl="node1" presStyleIdx="2" presStyleCnt="3">
@@ -3167,7 +3216,7 @@
           <a:p>
             <a:fld id="{A77DD275-2B8E-410D-A7C7-939BC2C1F376}" type="datetimeFigureOut">
               <a:rPr lang="zh-CN" altLang="en-US" smtClean="0"/>
-              <a:t>2014/3/7</a:t>
+              <a:t>2014/3/10</a:t>
             </a:fld>
             <a:endParaRPr lang="zh-CN" altLang="en-US"/>
           </a:p>
@@ -3877,7 +3926,7 @@
           <a:p>
             <a:fld id="{76EB64E7-0F4C-4BF2-B5BB-B7A8A5E230DE}" type="datetimeFigureOut">
               <a:rPr lang="zh-CN" altLang="en-US" smtClean="0"/>
-              <a:t>2014/3/7</a:t>
+              <a:t>2014/3/10</a:t>
             </a:fld>
             <a:endParaRPr lang="zh-CN" altLang="en-US"/>
           </a:p>
@@ -4152,7 +4201,7 @@
           <a:p>
             <a:fld id="{76EB64E7-0F4C-4BF2-B5BB-B7A8A5E230DE}" type="datetimeFigureOut">
               <a:rPr lang="zh-CN" altLang="en-US" smtClean="0"/>
-              <a:t>2014/3/7</a:t>
+              <a:t>2014/3/10</a:t>
             </a:fld>
             <a:endParaRPr lang="zh-CN" altLang="en-US"/>
           </a:p>
@@ -4346,7 +4395,7 @@
           <a:p>
             <a:fld id="{76EB64E7-0F4C-4BF2-B5BB-B7A8A5E230DE}" type="datetimeFigureOut">
               <a:rPr lang="zh-CN" altLang="en-US" smtClean="0"/>
-              <a:t>2014/3/7</a:t>
+              <a:t>2014/3/10</a:t>
             </a:fld>
             <a:endParaRPr lang="zh-CN" altLang="en-US"/>
           </a:p>
@@ -4619,7 +4668,7 @@
           <a:p>
             <a:fld id="{76EB64E7-0F4C-4BF2-B5BB-B7A8A5E230DE}" type="datetimeFigureOut">
               <a:rPr lang="zh-CN" altLang="en-US" smtClean="0"/>
-              <a:t>2014/3/7</a:t>
+              <a:t>2014/3/10</a:t>
             </a:fld>
             <a:endParaRPr lang="zh-CN" altLang="en-US"/>
           </a:p>
@@ -4960,7 +5009,7 @@
           <a:p>
             <a:fld id="{76EB64E7-0F4C-4BF2-B5BB-B7A8A5E230DE}" type="datetimeFigureOut">
               <a:rPr lang="zh-CN" altLang="en-US" smtClean="0"/>
-              <a:t>2014/3/7</a:t>
+              <a:t>2014/3/10</a:t>
             </a:fld>
             <a:endParaRPr lang="zh-CN" altLang="en-US"/>
           </a:p>
@@ -5583,7 +5632,7 @@
           <a:p>
             <a:fld id="{76EB64E7-0F4C-4BF2-B5BB-B7A8A5E230DE}" type="datetimeFigureOut">
               <a:rPr lang="zh-CN" altLang="en-US" smtClean="0"/>
-              <a:t>2014/3/7</a:t>
+              <a:t>2014/3/10</a:t>
             </a:fld>
             <a:endParaRPr lang="zh-CN" altLang="en-US"/>
           </a:p>
@@ -6443,7 +6492,7 @@
           <a:p>
             <a:fld id="{76EB64E7-0F4C-4BF2-B5BB-B7A8A5E230DE}" type="datetimeFigureOut">
               <a:rPr lang="zh-CN" altLang="en-US" smtClean="0"/>
-              <a:t>2014/3/7</a:t>
+              <a:t>2014/3/10</a:t>
             </a:fld>
             <a:endParaRPr lang="zh-CN" altLang="en-US"/>
           </a:p>
@@ -6613,7 +6662,7 @@
           <a:p>
             <a:fld id="{76EB64E7-0F4C-4BF2-B5BB-B7A8A5E230DE}" type="datetimeFigureOut">
               <a:rPr lang="zh-CN" altLang="en-US" smtClean="0"/>
-              <a:t>2014/3/7</a:t>
+              <a:t>2014/3/10</a:t>
             </a:fld>
             <a:endParaRPr lang="zh-CN" altLang="en-US"/>
           </a:p>
@@ -6793,7 +6842,7 @@
           <a:p>
             <a:fld id="{76EB64E7-0F4C-4BF2-B5BB-B7A8A5E230DE}" type="datetimeFigureOut">
               <a:rPr lang="zh-CN" altLang="en-US" smtClean="0"/>
-              <a:t>2014/3/7</a:t>
+              <a:t>2014/3/10</a:t>
             </a:fld>
             <a:endParaRPr lang="zh-CN" altLang="en-US"/>
           </a:p>
@@ -6963,7 +7012,7 @@
           <a:p>
             <a:fld id="{76EB64E7-0F4C-4BF2-B5BB-B7A8A5E230DE}" type="datetimeFigureOut">
               <a:rPr lang="zh-CN" altLang="en-US" smtClean="0"/>
-              <a:t>2014/3/7</a:t>
+              <a:t>2014/3/10</a:t>
             </a:fld>
             <a:endParaRPr lang="zh-CN" altLang="en-US"/>
           </a:p>
@@ -7210,7 +7259,7 @@
           <a:p>
             <a:fld id="{76EB64E7-0F4C-4BF2-B5BB-B7A8A5E230DE}" type="datetimeFigureOut">
               <a:rPr lang="zh-CN" altLang="en-US" smtClean="0"/>
-              <a:t>2014/3/7</a:t>
+              <a:t>2014/3/10</a:t>
             </a:fld>
             <a:endParaRPr lang="zh-CN" altLang="en-US"/>
           </a:p>
@@ -7502,7 +7551,7 @@
           <a:p>
             <a:fld id="{76EB64E7-0F4C-4BF2-B5BB-B7A8A5E230DE}" type="datetimeFigureOut">
               <a:rPr lang="zh-CN" altLang="en-US" smtClean="0"/>
-              <a:t>2014/3/7</a:t>
+              <a:t>2014/3/10</a:t>
             </a:fld>
             <a:endParaRPr lang="zh-CN" altLang="en-US"/>
           </a:p>
@@ -7946,7 +7995,7 @@
           <a:p>
             <a:fld id="{76EB64E7-0F4C-4BF2-B5BB-B7A8A5E230DE}" type="datetimeFigureOut">
               <a:rPr lang="zh-CN" altLang="en-US" smtClean="0"/>
-              <a:t>2014/3/7</a:t>
+              <a:t>2014/3/10</a:t>
             </a:fld>
             <a:endParaRPr lang="zh-CN" altLang="en-US"/>
           </a:p>
@@ -8064,7 +8113,7 @@
           <a:p>
             <a:fld id="{76EB64E7-0F4C-4BF2-B5BB-B7A8A5E230DE}" type="datetimeFigureOut">
               <a:rPr lang="zh-CN" altLang="en-US" smtClean="0"/>
-              <a:t>2014/3/7</a:t>
+              <a:t>2014/3/10</a:t>
             </a:fld>
             <a:endParaRPr lang="zh-CN" altLang="en-US"/>
           </a:p>
@@ -8159,7 +8208,7 @@
           <a:p>
             <a:fld id="{76EB64E7-0F4C-4BF2-B5BB-B7A8A5E230DE}" type="datetimeFigureOut">
               <a:rPr lang="zh-CN" altLang="en-US" smtClean="0"/>
-              <a:t>2014/3/7</a:t>
+              <a:t>2014/3/10</a:t>
             </a:fld>
             <a:endParaRPr lang="zh-CN" altLang="en-US"/>
           </a:p>
@@ -8438,7 +8487,7 @@
           <a:p>
             <a:fld id="{76EB64E7-0F4C-4BF2-B5BB-B7A8A5E230DE}" type="datetimeFigureOut">
               <a:rPr lang="zh-CN" altLang="en-US" smtClean="0"/>
-              <a:t>2014/3/7</a:t>
+              <a:t>2014/3/10</a:t>
             </a:fld>
             <a:endParaRPr lang="zh-CN" altLang="en-US"/>
           </a:p>
@@ -8713,7 +8762,7 @@
           <a:p>
             <a:fld id="{76EB64E7-0F4C-4BF2-B5BB-B7A8A5E230DE}" type="datetimeFigureOut">
               <a:rPr lang="zh-CN" altLang="en-US" smtClean="0"/>
-              <a:t>2014/3/7</a:t>
+              <a:t>2014/3/10</a:t>
             </a:fld>
             <a:endParaRPr lang="zh-CN" altLang="en-US"/>
           </a:p>
@@ -9142,7 +9191,7 @@
           <a:p>
             <a:fld id="{76EB64E7-0F4C-4BF2-B5BB-B7A8A5E230DE}" type="datetimeFigureOut">
               <a:rPr lang="zh-CN" altLang="en-US" smtClean="0"/>
-              <a:t>2014/3/7</a:t>
+              <a:t>2014/3/10</a:t>
             </a:fld>
             <a:endParaRPr lang="zh-CN" altLang="en-US"/>
           </a:p>
@@ -9710,11 +9759,7 @@
           <a:p>
             <a:r>
               <a:rPr lang="zh-CN" altLang="en-US" dirty="0" smtClean="0"/>
-              <a:t>功能</a:t>
-            </a:r>
-            <a:r>
-              <a:rPr lang="zh-CN" altLang="en-US" dirty="0" smtClean="0"/>
-              <a:t>介绍</a:t>
+              <a:t>功能介绍</a:t>
             </a:r>
             <a:endParaRPr lang="zh-CN" altLang="en-US" dirty="0"/>
           </a:p>
@@ -11477,15 +11522,7 @@
             </a:r>
             <a:r>
               <a:rPr lang="zh-CN" altLang="en-US" dirty="0" smtClean="0"/>
-              <a:t>对于</a:t>
-            </a:r>
-            <a:r>
-              <a:rPr lang="zh-CN" altLang="en-US" dirty="0" smtClean="0"/>
-              <a:t>服务器</a:t>
-            </a:r>
-            <a:r>
-              <a:rPr lang="zh-CN" altLang="en-US" dirty="0" smtClean="0"/>
-              <a:t>性能的极致追求</a:t>
+              <a:t>对于服务器性能的极致追求</a:t>
             </a:r>
             <a:endParaRPr lang="en-US" altLang="zh-CN" dirty="0" smtClean="0"/>
           </a:p>
@@ -12864,43 +12901,28 @@
             </a:r>
             <a:r>
               <a:rPr lang="zh-CN" altLang="en-US" dirty="0" smtClean="0"/>
-              <a:t>的性能</a:t>
-            </a:r>
+              <a:t>的性能不足，恶劣的设计可以导致各种头痛的问题</a:t>
+            </a:r>
+            <a:endParaRPr lang="en-US" altLang="zh-CN" dirty="0" smtClean="0"/>
+          </a:p>
+          <a:p>
             <a:r>
               <a:rPr lang="zh-CN" altLang="en-US" dirty="0" smtClean="0"/>
-              <a:t>不足，恶劣的设计可以导致各种头痛的问题</a:t>
+              <a:t>移动设备上的网络状况不良，会导致游戏体验变差</a:t>
             </a:r>
             <a:endParaRPr lang="en-US" altLang="zh-CN" dirty="0" smtClean="0"/>
           </a:p>
           <a:p>
+            <a:endParaRPr lang="en-US" altLang="zh-CN" dirty="0"/>
+          </a:p>
+          <a:p>
             <a:r>
               <a:rPr lang="zh-CN" altLang="en-US" dirty="0" smtClean="0"/>
-              <a:t>移动设备上的网络状况不良，</a:t>
+              <a:t>有没有更好解决方案</a:t>
             </a:r>
             <a:r>
               <a:rPr lang="zh-CN" altLang="en-US" dirty="0" smtClean="0"/>
-              <a:t>会导致</a:t>
-            </a:r>
-            <a:r>
-              <a:rPr lang="zh-CN" altLang="en-US" dirty="0" smtClean="0"/>
-              <a:t>游戏体验变差</a:t>
-            </a:r>
-            <a:endParaRPr lang="en-US" altLang="zh-CN" dirty="0" smtClean="0"/>
-          </a:p>
-          <a:p>
-            <a:endParaRPr lang="en-US" altLang="zh-CN" dirty="0"/>
-          </a:p>
-          <a:p>
-            <a:r>
-              <a:rPr lang="zh-CN" altLang="en-US" dirty="0" smtClean="0"/>
-              <a:t>有没有更好解决方案？</a:t>
-            </a:r>
-            <a:endParaRPr lang="en-US" altLang="zh-CN" dirty="0" smtClean="0"/>
-          </a:p>
-          <a:p>
-            <a:r>
-              <a:rPr lang="zh-CN" altLang="en-US" dirty="0" smtClean="0"/>
-              <a:t>重新理解客户端和服务端。把服务端和客户端从接口调用变成数据同步。</a:t>
+              <a:t>？</a:t>
             </a:r>
             <a:endParaRPr lang="zh-CN" altLang="en-US" dirty="0"/>
           </a:p>

</xml_diff>